<commit_message>
Updated the Files to Sarvam AI for Part 3, Ready for GenAI Hackathon DevFolio
</commit_message>
<xml_diff>
--- a/part2/templates/Berlin.pptx
+++ b/part2/templates/Berlin.pptx
@@ -4,6 +4,9 @@
   <p:sldMasterIdLst>
     <p:sldMasterId id="2147483926" r:id="rId1"/>
   </p:sldMasterIdLst>
+  <p:sldIdLst>
+    <p:sldId id="256" r:id="rId2"/>
+  </p:sldIdLst>
   <p:sldSz cx="12192000" cy="6858000"/>
   <p:notesSz cx="6858000" cy="9144000"/>
   <p:defaultTextStyle>
@@ -383,7 +386,7 @@
           <a:p>
             <a:fld id="{2B611ADB-1F4D-4526-B334-60383F9EFB0A}" type="datetimeFigureOut">
               <a:rPr lang="en-IN" smtClean="0"/>
-              <a:t>03-11-2023</a:t>
+              <a:t>10-06-2024</a:t>
             </a:fld>
             <a:endParaRPr lang="en-IN"/>
           </a:p>
@@ -797,7 +800,7 @@
           <a:p>
             <a:fld id="{2B611ADB-1F4D-4526-B334-60383F9EFB0A}" type="datetimeFigureOut">
               <a:rPr lang="en-IN" smtClean="0"/>
-              <a:t>03-11-2023</a:t>
+              <a:t>10-06-2024</a:t>
             </a:fld>
             <a:endParaRPr lang="en-IN"/>
           </a:p>
@@ -1133,7 +1136,7 @@
           <a:p>
             <a:fld id="{2B611ADB-1F4D-4526-B334-60383F9EFB0A}" type="datetimeFigureOut">
               <a:rPr lang="en-IN" smtClean="0"/>
-              <a:t>03-11-2023</a:t>
+              <a:t>10-06-2024</a:t>
             </a:fld>
             <a:endParaRPr lang="en-IN"/>
           </a:p>
@@ -1538,7 +1541,7 @@
           <a:p>
             <a:fld id="{2B611ADB-1F4D-4526-B334-60383F9EFB0A}" type="datetimeFigureOut">
               <a:rPr lang="en-IN" smtClean="0"/>
-              <a:t>03-11-2023</a:t>
+              <a:t>10-06-2024</a:t>
             </a:fld>
             <a:endParaRPr lang="en-IN"/>
           </a:p>
@@ -2106,7 +2109,7 @@
           <a:p>
             <a:fld id="{2B611ADB-1F4D-4526-B334-60383F9EFB0A}" type="datetimeFigureOut">
               <a:rPr lang="en-IN" smtClean="0"/>
-              <a:t>03-11-2023</a:t>
+              <a:t>10-06-2024</a:t>
             </a:fld>
             <a:endParaRPr lang="en-IN"/>
           </a:p>
@@ -2787,7 +2790,7 @@
           <a:p>
             <a:fld id="{2B611ADB-1F4D-4526-B334-60383F9EFB0A}" type="datetimeFigureOut">
               <a:rPr lang="en-IN" smtClean="0"/>
-              <a:t>03-11-2023</a:t>
+              <a:t>10-06-2024</a:t>
             </a:fld>
             <a:endParaRPr lang="en-IN"/>
           </a:p>
@@ -3700,7 +3703,7 @@
           <a:p>
             <a:fld id="{2B611ADB-1F4D-4526-B334-60383F9EFB0A}" type="datetimeFigureOut">
               <a:rPr lang="en-IN" smtClean="0"/>
-              <a:t>03-11-2023</a:t>
+              <a:t>10-06-2024</a:t>
             </a:fld>
             <a:endParaRPr lang="en-IN"/>
           </a:p>
@@ -4013,7 +4016,7 @@
           <a:p>
             <a:fld id="{2B611ADB-1F4D-4526-B334-60383F9EFB0A}" type="datetimeFigureOut">
               <a:rPr lang="en-IN" smtClean="0"/>
-              <a:t>03-11-2023</a:t>
+              <a:t>10-06-2024</a:t>
             </a:fld>
             <a:endParaRPr lang="en-IN"/>
           </a:p>
@@ -4277,7 +4280,7 @@
           <a:p>
             <a:fld id="{2B611ADB-1F4D-4526-B334-60383F9EFB0A}" type="datetimeFigureOut">
               <a:rPr lang="en-IN" smtClean="0"/>
-              <a:t>03-11-2023</a:t>
+              <a:t>10-06-2024</a:t>
             </a:fld>
             <a:endParaRPr lang="en-IN"/>
           </a:p>
@@ -4618,7 +4621,7 @@
           <a:p>
             <a:fld id="{2B611ADB-1F4D-4526-B334-60383F9EFB0A}" type="datetimeFigureOut">
               <a:rPr lang="en-IN" smtClean="0"/>
-              <a:t>03-11-2023</a:t>
+              <a:t>10-06-2024</a:t>
             </a:fld>
             <a:endParaRPr lang="en-IN"/>
           </a:p>
@@ -5007,7 +5010,7 @@
           <a:p>
             <a:fld id="{2B611ADB-1F4D-4526-B334-60383F9EFB0A}" type="datetimeFigureOut">
               <a:rPr lang="en-IN" smtClean="0"/>
-              <a:t>03-11-2023</a:t>
+              <a:t>10-06-2024</a:t>
             </a:fld>
             <a:endParaRPr lang="en-IN"/>
           </a:p>
@@ -5383,7 +5386,7 @@
           <a:p>
             <a:fld id="{2B611ADB-1F4D-4526-B334-60383F9EFB0A}" type="datetimeFigureOut">
               <a:rPr lang="en-IN" smtClean="0"/>
-              <a:t>03-11-2023</a:t>
+              <a:t>10-06-2024</a:t>
             </a:fld>
             <a:endParaRPr lang="en-IN"/>
           </a:p>
@@ -5889,7 +5892,7 @@
           <a:p>
             <a:fld id="{2B611ADB-1F4D-4526-B334-60383F9EFB0A}" type="datetimeFigureOut">
               <a:rPr lang="en-IN" smtClean="0"/>
-              <a:t>03-11-2023</a:t>
+              <a:t>10-06-2024</a:t>
             </a:fld>
             <a:endParaRPr lang="en-IN"/>
           </a:p>
@@ -6146,7 +6149,7 @@
           <a:p>
             <a:fld id="{2B611ADB-1F4D-4526-B334-60383F9EFB0A}" type="datetimeFigureOut">
               <a:rPr lang="en-IN" smtClean="0"/>
-              <a:t>03-11-2023</a:t>
+              <a:t>10-06-2024</a:t>
             </a:fld>
             <a:endParaRPr lang="en-IN"/>
           </a:p>
@@ -6309,7 +6312,7 @@
           <a:p>
             <a:fld id="{2B611ADB-1F4D-4526-B334-60383F9EFB0A}" type="datetimeFigureOut">
               <a:rPr lang="en-IN" smtClean="0"/>
-              <a:t>03-11-2023</a:t>
+              <a:t>10-06-2024</a:t>
             </a:fld>
             <a:endParaRPr lang="en-IN"/>
           </a:p>
@@ -6699,7 +6702,7 @@
           <a:p>
             <a:fld id="{2B611ADB-1F4D-4526-B334-60383F9EFB0A}" type="datetimeFigureOut">
               <a:rPr lang="en-IN" smtClean="0"/>
-              <a:t>03-11-2023</a:t>
+              <a:t>10-06-2024</a:t>
             </a:fld>
             <a:endParaRPr lang="en-IN"/>
           </a:p>
@@ -7108,7 +7111,7 @@
           <a:p>
             <a:fld id="{2B611ADB-1F4D-4526-B334-60383F9EFB0A}" type="datetimeFigureOut">
               <a:rPr lang="en-IN" smtClean="0"/>
-              <a:t>03-11-2023</a:t>
+              <a:t>10-06-2024</a:t>
             </a:fld>
             <a:endParaRPr lang="en-IN"/>
           </a:p>
@@ -7352,7 +7355,7 @@
           <a:p>
             <a:fld id="{2B611ADB-1F4D-4526-B334-60383F9EFB0A}" type="datetimeFigureOut">
               <a:rPr lang="en-IN" smtClean="0"/>
-              <a:t>03-11-2023</a:t>
+              <a:t>10-06-2024</a:t>
             </a:fld>
             <a:endParaRPr lang="en-IN"/>
           </a:p>
@@ -7781,6 +7784,74 @@
 </p:sldMaster>
 </file>
 
+<file path=ppt/slides/slide1.xml><?xml version="1.0" encoding="utf-8"?>
+<p:sld xmlns:a="http://schemas.openxmlformats.org/drawingml/2006/main" xmlns:r="http://schemas.openxmlformats.org/officeDocument/2006/relationships" xmlns:p="http://schemas.openxmlformats.org/presentationml/2006/main">
+  <p:cSld>
+    <p:spTree>
+      <p:nvGrpSpPr>
+        <p:cNvPr id="1" name=""/>
+        <p:cNvGrpSpPr/>
+        <p:nvPr/>
+      </p:nvGrpSpPr>
+      <p:grpSpPr>
+        <a:xfrm>
+          <a:off x="0" y="0"/>
+          <a:ext cx="0" cy="0"/>
+          <a:chOff x="0" y="0"/>
+          <a:chExt cx="0" cy="0"/>
+        </a:xfrm>
+      </p:grpSpPr>
+      <p:sp>
+        <p:nvSpPr>
+          <p:cNvPr id="2" name="Title 1"/>
+          <p:cNvSpPr>
+            <a:spLocks noGrp="1"/>
+          </p:cNvSpPr>
+          <p:nvPr>
+            <p:ph type="ctrTitle"/>
+          </p:nvPr>
+        </p:nvSpPr>
+        <p:spPr/>
+        <p:txBody>
+          <a:bodyPr/>
+          <a:lstStyle/>
+          <a:p>
+            <a:endParaRPr lang="en-IN"/>
+          </a:p>
+        </p:txBody>
+      </p:sp>
+      <p:sp>
+        <p:nvSpPr>
+          <p:cNvPr id="3" name="Subtitle 2"/>
+          <p:cNvSpPr>
+            <a:spLocks noGrp="1"/>
+          </p:cNvSpPr>
+          <p:nvPr>
+            <p:ph type="subTitle" idx="1"/>
+          </p:nvPr>
+        </p:nvSpPr>
+        <p:spPr/>
+        <p:txBody>
+          <a:bodyPr/>
+          <a:lstStyle/>
+          <a:p>
+            <a:endParaRPr lang="en-IN"/>
+          </a:p>
+        </p:txBody>
+      </p:sp>
+    </p:spTree>
+    <p:extLst>
+      <p:ext uri="{BB962C8B-B14F-4D97-AF65-F5344CB8AC3E}">
+        <p14:creationId xmlns:p14="http://schemas.microsoft.com/office/powerpoint/2010/main" val="2758706531"/>
+      </p:ext>
+    </p:extLst>
+  </p:cSld>
+  <p:clrMapOvr>
+    <a:masterClrMapping/>
+  </p:clrMapOvr>
+</p:sld>
+</file>
+
 <file path=ppt/theme/theme1.xml><?xml version="1.0" encoding="utf-8"?>
 <a:theme xmlns:a="http://schemas.openxmlformats.org/drawingml/2006/main" name="Berlin">
   <a:themeElements>

</xml_diff>